<commit_message>
Item #242. Unit tests done.
</commit_message>
<xml_diff>
--- a/docs/Reuniones/Sprint 4/Informe de Avance/2013-10-28-InformedeAvance.pptx
+++ b/docs/Reuniones/Sprint 4/Informe de Avance/2013-10-28-InformedeAvance.pptx
@@ -16,6 +16,7 @@
     <p:sldId id="264" r:id="rId10"/>
     <p:sldId id="265" r:id="rId11"/>
     <p:sldId id="266" r:id="rId12"/>
+    <p:sldId id="269" r:id="rId13"/>
   </p:sldIdLst>
   <p:sldSz cx="12192000" cy="6858000"/>
   <p:notesSz cx="6858000" cy="9144000"/>
@@ -116,7 +117,18 @@
   </p:defaultTextStyle>
   <p:extLst>
     <p:ext uri="{EFAFB233-063F-42B5-8137-9DF3F51BA10A}">
-      <p15:sldGuideLst xmlns="" xmlns:p15="http://schemas.microsoft.com/office/powerpoint/2012/main"/>
+      <p15:sldGuideLst xmlns:p15="http://schemas.microsoft.com/office/powerpoint/2012/main">
+        <p15:guide id="1" orient="horz" pos="2160">
+          <p15:clr>
+            <a:srgbClr val="A4A3A4"/>
+          </p15:clr>
+        </p15:guide>
+        <p15:guide id="2" pos="3840">
+          <p15:clr>
+            <a:srgbClr val="A4A3A4"/>
+          </p15:clr>
+        </p15:guide>
+      </p15:sldGuideLst>
     </p:ext>
   </p:extLst>
 </p:presentation>
@@ -323,7 +335,7 @@
             <a:fld id="{2E617C37-6303-42D8-BFE6-5EB24290275E}" type="datetimeFigureOut">
               <a:rPr lang="es-AR" smtClean="0"/>
               <a:pPr/>
-              <a:t>27/10/2013</a:t>
+              <a:t>28/10/2013</a:t>
             </a:fld>
             <a:endParaRPr lang="es-AR"/>
           </a:p>
@@ -386,7 +398,7 @@
             <a:fld id="{B3B4F1AB-1F0D-449D-B0D3-BE201CAD4743}" type="slidenum">
               <a:rPr lang="es-AR" smtClean="0"/>
               <a:pPr/>
-              <a:t>‹Nº›</a:t>
+              <a:t>‹#›</a:t>
             </a:fld>
             <a:endParaRPr lang="es-AR"/>
           </a:p>
@@ -395,7 +407,7 @@
     </p:spTree>
     <p:extLst>
       <p:ext uri="{BB962C8B-B14F-4D97-AF65-F5344CB8AC3E}">
-        <p14:creationId xmlns="" xmlns:p14="http://schemas.microsoft.com/office/powerpoint/2010/main" val="2978784971"/>
+        <p14:creationId xmlns:p14="http://schemas.microsoft.com/office/powerpoint/2010/main" val="2978784971"/>
       </p:ext>
     </p:extLst>
   </p:cSld>
@@ -515,7 +527,7 @@
             <a:fld id="{2E617C37-6303-42D8-BFE6-5EB24290275E}" type="datetimeFigureOut">
               <a:rPr lang="es-AR" smtClean="0"/>
               <a:pPr/>
-              <a:t>27/10/2013</a:t>
+              <a:t>28/10/2013</a:t>
             </a:fld>
             <a:endParaRPr lang="es-AR"/>
           </a:p>
@@ -558,7 +570,7 @@
             <a:fld id="{B3B4F1AB-1F0D-449D-B0D3-BE201CAD4743}" type="slidenum">
               <a:rPr lang="es-AR" smtClean="0"/>
               <a:pPr/>
-              <a:t>‹Nº›</a:t>
+              <a:t>‹#›</a:t>
             </a:fld>
             <a:endParaRPr lang="es-AR"/>
           </a:p>
@@ -567,7 +579,7 @@
     </p:spTree>
     <p:extLst>
       <p:ext uri="{BB962C8B-B14F-4D97-AF65-F5344CB8AC3E}">
-        <p14:creationId xmlns="" xmlns:p14="http://schemas.microsoft.com/office/powerpoint/2010/main" val="3414630072"/>
+        <p14:creationId xmlns:p14="http://schemas.microsoft.com/office/powerpoint/2010/main" val="3414630072"/>
       </p:ext>
     </p:extLst>
   </p:cSld>
@@ -697,7 +709,7 @@
             <a:fld id="{2E617C37-6303-42D8-BFE6-5EB24290275E}" type="datetimeFigureOut">
               <a:rPr lang="es-AR" smtClean="0"/>
               <a:pPr/>
-              <a:t>27/10/2013</a:t>
+              <a:t>28/10/2013</a:t>
             </a:fld>
             <a:endParaRPr lang="es-AR"/>
           </a:p>
@@ -740,7 +752,7 @@
             <a:fld id="{B3B4F1AB-1F0D-449D-B0D3-BE201CAD4743}" type="slidenum">
               <a:rPr lang="es-AR" smtClean="0"/>
               <a:pPr/>
-              <a:t>‹Nº›</a:t>
+              <a:t>‹#›</a:t>
             </a:fld>
             <a:endParaRPr lang="es-AR"/>
           </a:p>
@@ -749,7 +761,7 @@
     </p:spTree>
     <p:extLst>
       <p:ext uri="{BB962C8B-B14F-4D97-AF65-F5344CB8AC3E}">
-        <p14:creationId xmlns="" xmlns:p14="http://schemas.microsoft.com/office/powerpoint/2010/main" val="1732606121"/>
+        <p14:creationId xmlns:p14="http://schemas.microsoft.com/office/powerpoint/2010/main" val="1732606121"/>
       </p:ext>
     </p:extLst>
   </p:cSld>
@@ -869,7 +881,7 @@
             <a:fld id="{2E617C37-6303-42D8-BFE6-5EB24290275E}" type="datetimeFigureOut">
               <a:rPr lang="es-AR" smtClean="0"/>
               <a:pPr/>
-              <a:t>27/10/2013</a:t>
+              <a:t>28/10/2013</a:t>
             </a:fld>
             <a:endParaRPr lang="es-AR"/>
           </a:p>
@@ -912,7 +924,7 @@
             <a:fld id="{B3B4F1AB-1F0D-449D-B0D3-BE201CAD4743}" type="slidenum">
               <a:rPr lang="es-AR" smtClean="0"/>
               <a:pPr/>
-              <a:t>‹Nº›</a:t>
+              <a:t>‹#›</a:t>
             </a:fld>
             <a:endParaRPr lang="es-AR"/>
           </a:p>
@@ -921,7 +933,7 @@
     </p:spTree>
     <p:extLst>
       <p:ext uri="{BB962C8B-B14F-4D97-AF65-F5344CB8AC3E}">
-        <p14:creationId xmlns="" xmlns:p14="http://schemas.microsoft.com/office/powerpoint/2010/main" val="2877234401"/>
+        <p14:creationId xmlns:p14="http://schemas.microsoft.com/office/powerpoint/2010/main" val="2877234401"/>
       </p:ext>
     </p:extLst>
   </p:cSld>
@@ -1127,7 +1139,7 @@
             <a:fld id="{2E617C37-6303-42D8-BFE6-5EB24290275E}" type="datetimeFigureOut">
               <a:rPr lang="es-AR" smtClean="0"/>
               <a:pPr/>
-              <a:t>27/10/2013</a:t>
+              <a:t>28/10/2013</a:t>
             </a:fld>
             <a:endParaRPr lang="es-AR"/>
           </a:p>
@@ -1170,7 +1182,7 @@
             <a:fld id="{B3B4F1AB-1F0D-449D-B0D3-BE201CAD4743}" type="slidenum">
               <a:rPr lang="es-AR" smtClean="0"/>
               <a:pPr/>
-              <a:t>‹Nº›</a:t>
+              <a:t>‹#›</a:t>
             </a:fld>
             <a:endParaRPr lang="es-AR"/>
           </a:p>
@@ -1179,7 +1191,7 @@
     </p:spTree>
     <p:extLst>
       <p:ext uri="{BB962C8B-B14F-4D97-AF65-F5344CB8AC3E}">
-        <p14:creationId xmlns="" xmlns:p14="http://schemas.microsoft.com/office/powerpoint/2010/main" val="2866971960"/>
+        <p14:creationId xmlns:p14="http://schemas.microsoft.com/office/powerpoint/2010/main" val="2866971960"/>
       </p:ext>
     </p:extLst>
   </p:cSld>
@@ -1417,7 +1429,7 @@
             <a:fld id="{2E617C37-6303-42D8-BFE6-5EB24290275E}" type="datetimeFigureOut">
               <a:rPr lang="es-AR" smtClean="0"/>
               <a:pPr/>
-              <a:t>27/10/2013</a:t>
+              <a:t>28/10/2013</a:t>
             </a:fld>
             <a:endParaRPr lang="es-AR"/>
           </a:p>
@@ -1460,7 +1472,7 @@
             <a:fld id="{B3B4F1AB-1F0D-449D-B0D3-BE201CAD4743}" type="slidenum">
               <a:rPr lang="es-AR" smtClean="0"/>
               <a:pPr/>
-              <a:t>‹Nº›</a:t>
+              <a:t>‹#›</a:t>
             </a:fld>
             <a:endParaRPr lang="es-AR"/>
           </a:p>
@@ -1469,7 +1481,7 @@
     </p:spTree>
     <p:extLst>
       <p:ext uri="{BB962C8B-B14F-4D97-AF65-F5344CB8AC3E}">
-        <p14:creationId xmlns="" xmlns:p14="http://schemas.microsoft.com/office/powerpoint/2010/main" val="2046317476"/>
+        <p14:creationId xmlns:p14="http://schemas.microsoft.com/office/powerpoint/2010/main" val="2046317476"/>
       </p:ext>
     </p:extLst>
   </p:cSld>
@@ -1857,7 +1869,7 @@
             <a:fld id="{2E617C37-6303-42D8-BFE6-5EB24290275E}" type="datetimeFigureOut">
               <a:rPr lang="es-AR" smtClean="0"/>
               <a:pPr/>
-              <a:t>27/10/2013</a:t>
+              <a:t>28/10/2013</a:t>
             </a:fld>
             <a:endParaRPr lang="es-AR"/>
           </a:p>
@@ -1900,7 +1912,7 @@
             <a:fld id="{B3B4F1AB-1F0D-449D-B0D3-BE201CAD4743}" type="slidenum">
               <a:rPr lang="es-AR" smtClean="0"/>
               <a:pPr/>
-              <a:t>‹Nº›</a:t>
+              <a:t>‹#›</a:t>
             </a:fld>
             <a:endParaRPr lang="es-AR"/>
           </a:p>
@@ -1909,7 +1921,7 @@
     </p:spTree>
     <p:extLst>
       <p:ext uri="{BB962C8B-B14F-4D97-AF65-F5344CB8AC3E}">
-        <p14:creationId xmlns="" xmlns:p14="http://schemas.microsoft.com/office/powerpoint/2010/main" val="4131858352"/>
+        <p14:creationId xmlns:p14="http://schemas.microsoft.com/office/powerpoint/2010/main" val="4131858352"/>
       </p:ext>
     </p:extLst>
   </p:cSld>
@@ -1977,7 +1989,7 @@
             <a:fld id="{2E617C37-6303-42D8-BFE6-5EB24290275E}" type="datetimeFigureOut">
               <a:rPr lang="es-AR" smtClean="0"/>
               <a:pPr/>
-              <a:t>27/10/2013</a:t>
+              <a:t>28/10/2013</a:t>
             </a:fld>
             <a:endParaRPr lang="es-AR"/>
           </a:p>
@@ -2020,7 +2032,7 @@
             <a:fld id="{B3B4F1AB-1F0D-449D-B0D3-BE201CAD4743}" type="slidenum">
               <a:rPr lang="es-AR" smtClean="0"/>
               <a:pPr/>
-              <a:t>‹Nº›</a:t>
+              <a:t>‹#›</a:t>
             </a:fld>
             <a:endParaRPr lang="es-AR"/>
           </a:p>
@@ -2029,7 +2041,7 @@
     </p:spTree>
     <p:extLst>
       <p:ext uri="{BB962C8B-B14F-4D97-AF65-F5344CB8AC3E}">
-        <p14:creationId xmlns="" xmlns:p14="http://schemas.microsoft.com/office/powerpoint/2010/main" val="677745671"/>
+        <p14:creationId xmlns:p14="http://schemas.microsoft.com/office/powerpoint/2010/main" val="677745671"/>
       </p:ext>
     </p:extLst>
   </p:cSld>
@@ -2074,7 +2086,7 @@
             <a:fld id="{2E617C37-6303-42D8-BFE6-5EB24290275E}" type="datetimeFigureOut">
               <a:rPr lang="es-AR" smtClean="0"/>
               <a:pPr/>
-              <a:t>27/10/2013</a:t>
+              <a:t>28/10/2013</a:t>
             </a:fld>
             <a:endParaRPr lang="es-AR"/>
           </a:p>
@@ -2117,7 +2129,7 @@
             <a:fld id="{B3B4F1AB-1F0D-449D-B0D3-BE201CAD4743}" type="slidenum">
               <a:rPr lang="es-AR" smtClean="0"/>
               <a:pPr/>
-              <a:t>‹Nº›</a:t>
+              <a:t>‹#›</a:t>
             </a:fld>
             <a:endParaRPr lang="es-AR"/>
           </a:p>
@@ -2126,7 +2138,7 @@
     </p:spTree>
     <p:extLst>
       <p:ext uri="{BB962C8B-B14F-4D97-AF65-F5344CB8AC3E}">
-        <p14:creationId xmlns="" xmlns:p14="http://schemas.microsoft.com/office/powerpoint/2010/main" val="422860722"/>
+        <p14:creationId xmlns:p14="http://schemas.microsoft.com/office/powerpoint/2010/main" val="422860722"/>
       </p:ext>
     </p:extLst>
   </p:cSld>
@@ -2432,7 +2444,7 @@
             <a:fld id="{2E617C37-6303-42D8-BFE6-5EB24290275E}" type="datetimeFigureOut">
               <a:rPr lang="es-AR" smtClean="0"/>
               <a:pPr/>
-              <a:t>27/10/2013</a:t>
+              <a:t>28/10/2013</a:t>
             </a:fld>
             <a:endParaRPr lang="es-AR"/>
           </a:p>
@@ -2485,7 +2497,7 @@
             <a:fld id="{B3B4F1AB-1F0D-449D-B0D3-BE201CAD4743}" type="slidenum">
               <a:rPr lang="es-AR" smtClean="0"/>
               <a:pPr/>
-              <a:t>‹Nº›</a:t>
+              <a:t>‹#›</a:t>
             </a:fld>
             <a:endParaRPr lang="es-AR"/>
           </a:p>
@@ -2494,7 +2506,7 @@
     </p:spTree>
     <p:extLst>
       <p:ext uri="{BB962C8B-B14F-4D97-AF65-F5344CB8AC3E}">
-        <p14:creationId xmlns="" xmlns:p14="http://schemas.microsoft.com/office/powerpoint/2010/main" val="4176082231"/>
+        <p14:creationId xmlns:p14="http://schemas.microsoft.com/office/powerpoint/2010/main" val="4176082231"/>
       </p:ext>
     </p:extLst>
   </p:cSld>
@@ -2750,7 +2762,7 @@
             <a:fld id="{2E617C37-6303-42D8-BFE6-5EB24290275E}" type="datetimeFigureOut">
               <a:rPr lang="es-AR" smtClean="0"/>
               <a:pPr/>
-              <a:t>27/10/2013</a:t>
+              <a:t>28/10/2013</a:t>
             </a:fld>
             <a:endParaRPr lang="es-AR"/>
           </a:p>
@@ -2813,7 +2825,7 @@
             <a:fld id="{B3B4F1AB-1F0D-449D-B0D3-BE201CAD4743}" type="slidenum">
               <a:rPr lang="es-AR" smtClean="0"/>
               <a:pPr/>
-              <a:t>‹Nº›</a:t>
+              <a:t>‹#›</a:t>
             </a:fld>
             <a:endParaRPr lang="es-AR"/>
           </a:p>
@@ -2822,7 +2834,7 @@
     </p:spTree>
     <p:extLst>
       <p:ext uri="{BB962C8B-B14F-4D97-AF65-F5344CB8AC3E}">
-        <p14:creationId xmlns="" xmlns:p14="http://schemas.microsoft.com/office/powerpoint/2010/main" val="3433054844"/>
+        <p14:creationId xmlns:p14="http://schemas.microsoft.com/office/powerpoint/2010/main" val="3433054844"/>
       </p:ext>
     </p:extLst>
   </p:cSld>
@@ -2985,7 +2997,7 @@
             <a:fld id="{2E617C37-6303-42D8-BFE6-5EB24290275E}" type="datetimeFigureOut">
               <a:rPr lang="es-AR" smtClean="0"/>
               <a:pPr/>
-              <a:t>27/10/2013</a:t>
+              <a:t>28/10/2013</a:t>
             </a:fld>
             <a:endParaRPr lang="es-AR"/>
           </a:p>
@@ -3068,7 +3080,7 @@
             <a:fld id="{B3B4F1AB-1F0D-449D-B0D3-BE201CAD4743}" type="slidenum">
               <a:rPr lang="es-AR" smtClean="0"/>
               <a:pPr/>
-              <a:t>‹Nº›</a:t>
+              <a:t>‹#›</a:t>
             </a:fld>
             <a:endParaRPr lang="es-AR"/>
           </a:p>
@@ -3077,7 +3089,7 @@
     </p:spTree>
     <p:extLst>
       <p:ext uri="{BB962C8B-B14F-4D97-AF65-F5344CB8AC3E}">
-        <p14:creationId xmlns="" xmlns:p14="http://schemas.microsoft.com/office/powerpoint/2010/main" val="4103197459"/>
+        <p14:creationId xmlns:p14="http://schemas.microsoft.com/office/powerpoint/2010/main" val="4103197459"/>
       </p:ext>
     </p:extLst>
   </p:cSld>
@@ -3592,7 +3604,7 @@
     </p:spTree>
     <p:extLst>
       <p:ext uri="{BB962C8B-B14F-4D97-AF65-F5344CB8AC3E}">
-        <p14:creationId xmlns="" xmlns:p14="http://schemas.microsoft.com/office/powerpoint/2010/main" val="3686140897"/>
+        <p14:creationId xmlns:p14="http://schemas.microsoft.com/office/powerpoint/2010/main" val="3686140897"/>
       </p:ext>
     </p:extLst>
   </p:cSld>
@@ -3805,7 +3817,7 @@
     </p:spTree>
     <p:extLst>
       <p:ext uri="{BB962C8B-B14F-4D97-AF65-F5344CB8AC3E}">
-        <p14:creationId xmlns="" xmlns:p14="http://schemas.microsoft.com/office/powerpoint/2010/main" val="3795601384"/>
+        <p14:creationId xmlns:p14="http://schemas.microsoft.com/office/powerpoint/2010/main" val="3795601384"/>
       </p:ext>
     </p:extLst>
   </p:cSld>
@@ -4021,7 +4033,146 @@
     </p:spTree>
     <p:extLst>
       <p:ext uri="{BB962C8B-B14F-4D97-AF65-F5344CB8AC3E}">
-        <p14:creationId xmlns="" xmlns:p14="http://schemas.microsoft.com/office/powerpoint/2010/main" val="3795601384"/>
+        <p14:creationId xmlns:p14="http://schemas.microsoft.com/office/powerpoint/2010/main" val="3795601384"/>
+      </p:ext>
+    </p:extLst>
+  </p:cSld>
+  <p:clrMapOvr>
+    <a:masterClrMapping/>
+  </p:clrMapOvr>
+  <p:timing>
+    <p:tnLst>
+      <p:par>
+        <p:cTn id="1" dur="indefinite" restart="never" nodeType="tmRoot"/>
+      </p:par>
+    </p:tnLst>
+  </p:timing>
+</p:sld>
+</file>
+
+<file path=ppt/slides/slide12.xml><?xml version="1.0" encoding="utf-8"?>
+<p:sld xmlns:a="http://schemas.openxmlformats.org/drawingml/2006/main" xmlns:r="http://schemas.openxmlformats.org/officeDocument/2006/relationships" xmlns:p="http://schemas.openxmlformats.org/presentationml/2006/main">
+  <p:cSld>
+    <p:spTree>
+      <p:nvGrpSpPr>
+        <p:cNvPr id="1" name=""/>
+        <p:cNvGrpSpPr/>
+        <p:nvPr/>
+      </p:nvGrpSpPr>
+      <p:grpSpPr>
+        <a:xfrm>
+          <a:off x="0" y="0"/>
+          <a:ext cx="0" cy="0"/>
+          <a:chOff x="0" y="0"/>
+          <a:chExt cx="0" cy="0"/>
+        </a:xfrm>
+      </p:grpSpPr>
+      <p:sp>
+        <p:nvSpPr>
+          <p:cNvPr id="2" name="1 Título"/>
+          <p:cNvSpPr>
+            <a:spLocks noGrp="1"/>
+          </p:cNvSpPr>
+          <p:nvPr>
+            <p:ph type="title"/>
+          </p:nvPr>
+        </p:nvSpPr>
+        <p:spPr>
+          <a:xfrm>
+            <a:off x="2024034" y="142852"/>
+            <a:ext cx="8229600" cy="1344203"/>
+          </a:xfrm>
+        </p:spPr>
+        <p:txBody>
+          <a:bodyPr/>
+          <a:lstStyle/>
+          <a:p>
+            <a:pPr algn="ctr"/>
+            <a:r>
+              <a:rPr lang="en-US" dirty="0" smtClean="0"/>
+              <a:t>Para </a:t>
+            </a:r>
+            <a:r>
+              <a:rPr lang="en-US" dirty="0" err="1" smtClean="0"/>
+              <a:t>hablar</a:t>
+            </a:r>
+            <a:endParaRPr lang="es-AR" sz="3600" i="1" dirty="0"/>
+          </a:p>
+        </p:txBody>
+      </p:sp>
+      <p:sp>
+        <p:nvSpPr>
+          <p:cNvPr id="3" name="2 Marcador de contenido"/>
+          <p:cNvSpPr>
+            <a:spLocks noGrp="1"/>
+          </p:cNvSpPr>
+          <p:nvPr>
+            <p:ph idx="1"/>
+          </p:nvPr>
+        </p:nvSpPr>
+        <p:spPr>
+          <a:xfrm>
+            <a:off x="2106187" y="1745674"/>
+            <a:ext cx="8065294" cy="4174836"/>
+          </a:xfrm>
+        </p:spPr>
+        <p:txBody>
+          <a:bodyPr>
+            <a:noAutofit/>
+          </a:bodyPr>
+          <a:lstStyle/>
+          <a:p>
+            <a:pPr>
+              <a:buFont typeface="Arial" panose="020B0604020202020204" pitchFamily="34" charset="0"/>
+              <a:buChar char="•"/>
+            </a:pPr>
+            <a:r>
+              <a:rPr lang="en-US" sz="3200" dirty="0" smtClean="0"/>
+              <a:t> </a:t>
+            </a:r>
+            <a:r>
+              <a:rPr lang="en-US" sz="3200" dirty="0" err="1" smtClean="0"/>
+              <a:t>Capacidad</a:t>
+            </a:r>
+            <a:r>
+              <a:rPr lang="en-US" sz="3200" dirty="0" smtClean="0"/>
+              <a:t> de </a:t>
+            </a:r>
+            <a:r>
+              <a:rPr lang="en-US" sz="3200" dirty="0" err="1" smtClean="0"/>
+              <a:t>e</a:t>
+            </a:r>
+            <a:r>
+              <a:rPr lang="en-US" sz="3200" dirty="0" err="1" smtClean="0"/>
+              <a:t>ditar</a:t>
+            </a:r>
+            <a:r>
+              <a:rPr lang="en-US" sz="3200" dirty="0" smtClean="0"/>
+              <a:t> </a:t>
+            </a:r>
+            <a:r>
+              <a:rPr lang="en-US" sz="3200" dirty="0" err="1"/>
+              <a:t>s</a:t>
+            </a:r>
+            <a:r>
+              <a:rPr lang="en-US" sz="3200" dirty="0" err="1" smtClean="0"/>
+              <a:t>ala</a:t>
+            </a:r>
+            <a:endParaRPr lang="en-US" sz="3200" dirty="0" smtClean="0"/>
+          </a:p>
+          <a:p>
+            <a:pPr>
+              <a:buFont typeface="Arial" panose="020B0604020202020204" pitchFamily="34" charset="0"/>
+              <a:buChar char="•"/>
+            </a:pPr>
+            <a:endParaRPr lang="es-AR" sz="3200" dirty="0" smtClean="0"/>
+          </a:p>
+        </p:txBody>
+      </p:sp>
+    </p:spTree>
+    <p:extLst>
+      <p:ext uri="{BB962C8B-B14F-4D97-AF65-F5344CB8AC3E}">
+        <p14:creationId xmlns:p14="http://schemas.microsoft.com/office/powerpoint/2010/main" val="127048368"/>
       </p:ext>
     </p:extLst>
   </p:cSld>
@@ -4142,7 +4293,7 @@
     </p:spTree>
     <p:extLst>
       <p:ext uri="{BB962C8B-B14F-4D97-AF65-F5344CB8AC3E}">
-        <p14:creationId xmlns="" xmlns:p14="http://schemas.microsoft.com/office/powerpoint/2010/main" val="253913631"/>
+        <p14:creationId xmlns:p14="http://schemas.microsoft.com/office/powerpoint/2010/main" val="253913631"/>
       </p:ext>
     </p:extLst>
   </p:cSld>
@@ -4251,7 +4402,7 @@
     </p:spTree>
     <p:extLst>
       <p:ext uri="{BB962C8B-B14F-4D97-AF65-F5344CB8AC3E}">
-        <p14:creationId xmlns="" xmlns:p14="http://schemas.microsoft.com/office/powerpoint/2010/main" val="1027980817"/>
+        <p14:creationId xmlns:p14="http://schemas.microsoft.com/office/powerpoint/2010/main" val="1027980817"/>
       </p:ext>
     </p:extLst>
   </p:cSld>
@@ -4351,7 +4502,7 @@
     </p:spTree>
     <p:extLst>
       <p:ext uri="{BB962C8B-B14F-4D97-AF65-F5344CB8AC3E}">
-        <p14:creationId xmlns="" xmlns:p14="http://schemas.microsoft.com/office/powerpoint/2010/main" val="3795601384"/>
+        <p14:creationId xmlns:p14="http://schemas.microsoft.com/office/powerpoint/2010/main" val="3795601384"/>
       </p:ext>
     </p:extLst>
   </p:cSld>
@@ -11868,7 +12019,7 @@
     </p:spTree>
     <p:extLst>
       <p:ext uri="{BB962C8B-B14F-4D97-AF65-F5344CB8AC3E}">
-        <p14:creationId xmlns="" xmlns:p14="http://schemas.microsoft.com/office/powerpoint/2010/main" val="3795601384"/>
+        <p14:creationId xmlns:p14="http://schemas.microsoft.com/office/powerpoint/2010/main" val="3795601384"/>
       </p:ext>
     </p:extLst>
   </p:cSld>
@@ -12050,7 +12201,7 @@
     </p:spTree>
     <p:extLst>
       <p:ext uri="{BB962C8B-B14F-4D97-AF65-F5344CB8AC3E}">
-        <p14:creationId xmlns="" xmlns:p14="http://schemas.microsoft.com/office/powerpoint/2010/main" val="3795601384"/>
+        <p14:creationId xmlns:p14="http://schemas.microsoft.com/office/powerpoint/2010/main" val="3795601384"/>
       </p:ext>
     </p:extLst>
   </p:cSld>
@@ -12297,7 +12448,7 @@
     </p:spTree>
     <p:extLst>
       <p:ext uri="{BB962C8B-B14F-4D97-AF65-F5344CB8AC3E}">
-        <p14:creationId xmlns="" xmlns:p14="http://schemas.microsoft.com/office/powerpoint/2010/main" val="3795601384"/>
+        <p14:creationId xmlns:p14="http://schemas.microsoft.com/office/powerpoint/2010/main" val="3795601384"/>
       </p:ext>
     </p:extLst>
   </p:cSld>
@@ -12551,7 +12702,7 @@
     </p:spTree>
     <p:extLst>
       <p:ext uri="{BB962C8B-B14F-4D97-AF65-F5344CB8AC3E}">
-        <p14:creationId xmlns="" xmlns:p14="http://schemas.microsoft.com/office/powerpoint/2010/main" val="3795601384"/>
+        <p14:creationId xmlns:p14="http://schemas.microsoft.com/office/powerpoint/2010/main" val="3795601384"/>
       </p:ext>
     </p:extLst>
   </p:cSld>
@@ -12758,7 +12909,7 @@
     </p:spTree>
     <p:extLst>
       <p:ext uri="{BB962C8B-B14F-4D97-AF65-F5344CB8AC3E}">
-        <p14:creationId xmlns="" xmlns:p14="http://schemas.microsoft.com/office/powerpoint/2010/main" val="3795601384"/>
+        <p14:creationId xmlns:p14="http://schemas.microsoft.com/office/powerpoint/2010/main" val="3795601384"/>
       </p:ext>
     </p:extLst>
   </p:cSld>
@@ -13006,7 +13157,7 @@
   <a:extraClrSchemeLst/>
   <a:extLst>
     <a:ext uri="{05A4C25C-085E-4340-85A3-A5531E510DB2}">
-      <thm15:themeFamily xmlns="" xmlns:thm15="http://schemas.microsoft.com/office/thememl/2012/main" name="Metropolitan" id="{4C5440D6-04D2-4954-96CF-F251137069B2}" vid="{79CFCA13-9412-4290-BB4B-85112F88857B}"/>
+      <thm15:themeFamily xmlns:thm15="http://schemas.microsoft.com/office/thememl/2012/main" name="Metropolitan" id="{4C5440D6-04D2-4954-96CF-F251137069B2}" vid="{79CFCA13-9412-4290-BB4B-85112F88857B}"/>
     </a:ext>
   </a:extLst>
 </a:theme>

</xml_diff>

<commit_message>
Item #324. Logic done, still to do tests.
</commit_message>
<xml_diff>
--- a/docs/Reuniones/Sprint 4/Informe de Avance/2013-10-28-InformedeAvance.pptx
+++ b/docs/Reuniones/Sprint 4/Informe de Avance/2013-10-28-InformedeAvance.pptx
@@ -4140,23 +4140,38 @@
             </a:r>
             <a:r>
               <a:rPr lang="en-US" sz="3200" dirty="0" err="1" smtClean="0"/>
-              <a:t>e</a:t>
-            </a:r>
-            <a:r>
-              <a:rPr lang="en-US" sz="3200" dirty="0" err="1" smtClean="0"/>
-              <a:t>ditar</a:t>
+              <a:t>editar</a:t>
             </a:r>
             <a:r>
               <a:rPr lang="en-US" sz="3200" dirty="0" smtClean="0"/>
               <a:t> </a:t>
             </a:r>
             <a:r>
-              <a:rPr lang="en-US" sz="3200" dirty="0" err="1"/>
-              <a:t>s</a:t>
-            </a:r>
-            <a:r>
               <a:rPr lang="en-US" sz="3200" dirty="0" err="1" smtClean="0"/>
-              <a:t>ala</a:t>
+              <a:t>sala</a:t>
+            </a:r>
+            <a:endParaRPr lang="en-US" sz="3200" dirty="0" smtClean="0"/>
+          </a:p>
+          <a:p>
+            <a:pPr>
+              <a:buFont typeface="Arial" panose="020B0604020202020204" pitchFamily="34" charset="0"/>
+              <a:buChar char="•"/>
+            </a:pPr>
+            <a:r>
+              <a:rPr lang="en-US" sz="3200" dirty="0" smtClean="0"/>
+              <a:t> </a:t>
+            </a:r>
+            <a:r>
+              <a:rPr lang="en-US" sz="3200" dirty="0" err="1" smtClean="0"/>
+              <a:t>Exámen</a:t>
+            </a:r>
+            <a:r>
+              <a:rPr lang="en-US" sz="3200" dirty="0" smtClean="0"/>
+              <a:t> y </a:t>
+            </a:r>
+            <a:r>
+              <a:rPr lang="en-US" sz="3200" dirty="0" err="1" smtClean="0"/>
+              <a:t>reportes</a:t>
             </a:r>
             <a:endParaRPr lang="en-US" sz="3200" dirty="0" smtClean="0"/>
           </a:p>

</xml_diff>

<commit_message>
Fixed bugs in functional tests
</commit_message>
<xml_diff>
--- a/docs/Reuniones/Sprint 4/Informe de Avance/2013-10-28-InformedeAvance.pptx
+++ b/docs/Reuniones/Sprint 4/Informe de Avance/2013-10-28-InformedeAvance.pptx
@@ -4738,6 +4738,25 @@
               <a:buFont typeface="Arial" panose="020B0604020202020204" pitchFamily="34" charset="0"/>
               <a:buChar char="•"/>
             </a:pPr>
+            <a:r>
+              <a:rPr lang="en-US" sz="3200" dirty="0" err="1" smtClean="0"/>
+              <a:t>Pruebas</a:t>
+            </a:r>
+            <a:r>
+              <a:rPr lang="en-US" sz="3200" dirty="0" smtClean="0"/>
+              <a:t> </a:t>
+            </a:r>
+            <a:r>
+              <a:rPr lang="en-US" sz="3200" dirty="0" err="1" smtClean="0"/>
+              <a:t>funcionales</a:t>
+            </a:r>
+            <a:endParaRPr lang="en-US" sz="3200" dirty="0" smtClean="0"/>
+          </a:p>
+          <a:p>
+            <a:pPr>
+              <a:buFont typeface="Arial" panose="020B0604020202020204" pitchFamily="34" charset="0"/>
+              <a:buChar char="•"/>
+            </a:pPr>
             <a:endParaRPr lang="es-AR" sz="3200" dirty="0" smtClean="0"/>
           </a:p>
         </p:txBody>
@@ -4982,11 +5001,7 @@
             </a:pPr>
             <a:r>
               <a:rPr lang="en-US" sz="3200" dirty="0" err="1" smtClean="0"/>
-              <a:t>Pantall</a:t>
-            </a:r>
-            <a:r>
-              <a:rPr lang="en-US" sz="3200" dirty="0" err="1" smtClean="0"/>
-              <a:t>a</a:t>
+              <a:t>Pantalla</a:t>
             </a:r>
             <a:r>
               <a:rPr lang="en-US" sz="3200" dirty="0" smtClean="0"/>

</xml_diff>